<commit_message>
Updated with recorded video
</commit_message>
<xml_diff>
--- a/Assignment_files/Presentation.pptx
+++ b/Assignment_files/Presentation.pptx
@@ -115,6 +115,11 @@
       </a:defRPr>
     </a:lvl9pPr>
   </p:defaultTextStyle>
+  <p:extLst>
+    <p:ext uri="{EFAFB233-063F-42B5-8137-9DF3F51BA10A}">
+      <p15:sldGuideLst xmlns:p15="http://schemas.microsoft.com/office/powerpoint/2012/main"/>
+    </p:ext>
+  </p:extLst>
 </p:presentation>
 </file>
 
@@ -249,7 +254,7 @@
           <a:p>
             <a:fld id="{4CC1A8DB-AB3A-4A3D-B199-FBA3EFAF3F32}" type="datetimeFigureOut">
               <a:rPr lang="en-GB" smtClean="0"/>
-              <a:t>17/01/2026</a:t>
+              <a:t>18/01/2026</a:t>
             </a:fld>
             <a:endParaRPr lang="en-GB"/>
           </a:p>
@@ -419,7 +424,7 @@
           <a:p>
             <a:fld id="{4CC1A8DB-AB3A-4A3D-B199-FBA3EFAF3F32}" type="datetimeFigureOut">
               <a:rPr lang="en-GB" smtClean="0"/>
-              <a:t>17/01/2026</a:t>
+              <a:t>18/01/2026</a:t>
             </a:fld>
             <a:endParaRPr lang="en-GB"/>
           </a:p>
@@ -599,7 +604,7 @@
           <a:p>
             <a:fld id="{4CC1A8DB-AB3A-4A3D-B199-FBA3EFAF3F32}" type="datetimeFigureOut">
               <a:rPr lang="en-GB" smtClean="0"/>
-              <a:t>17/01/2026</a:t>
+              <a:t>18/01/2026</a:t>
             </a:fld>
             <a:endParaRPr lang="en-GB"/>
           </a:p>
@@ -769,7 +774,7 @@
           <a:p>
             <a:fld id="{4CC1A8DB-AB3A-4A3D-B199-FBA3EFAF3F32}" type="datetimeFigureOut">
               <a:rPr lang="en-GB" smtClean="0"/>
-              <a:t>17/01/2026</a:t>
+              <a:t>18/01/2026</a:t>
             </a:fld>
             <a:endParaRPr lang="en-GB"/>
           </a:p>
@@ -1015,7 +1020,7 @@
           <a:p>
             <a:fld id="{4CC1A8DB-AB3A-4A3D-B199-FBA3EFAF3F32}" type="datetimeFigureOut">
               <a:rPr lang="en-GB" smtClean="0"/>
-              <a:t>17/01/2026</a:t>
+              <a:t>18/01/2026</a:t>
             </a:fld>
             <a:endParaRPr lang="en-GB"/>
           </a:p>
@@ -1247,7 +1252,7 @@
           <a:p>
             <a:fld id="{4CC1A8DB-AB3A-4A3D-B199-FBA3EFAF3F32}" type="datetimeFigureOut">
               <a:rPr lang="en-GB" smtClean="0"/>
-              <a:t>17/01/2026</a:t>
+              <a:t>18/01/2026</a:t>
             </a:fld>
             <a:endParaRPr lang="en-GB"/>
           </a:p>
@@ -1614,7 +1619,7 @@
           <a:p>
             <a:fld id="{4CC1A8DB-AB3A-4A3D-B199-FBA3EFAF3F32}" type="datetimeFigureOut">
               <a:rPr lang="en-GB" smtClean="0"/>
-              <a:t>17/01/2026</a:t>
+              <a:t>18/01/2026</a:t>
             </a:fld>
             <a:endParaRPr lang="en-GB"/>
           </a:p>
@@ -1732,7 +1737,7 @@
           <a:p>
             <a:fld id="{4CC1A8DB-AB3A-4A3D-B199-FBA3EFAF3F32}" type="datetimeFigureOut">
               <a:rPr lang="en-GB" smtClean="0"/>
-              <a:t>17/01/2026</a:t>
+              <a:t>18/01/2026</a:t>
             </a:fld>
             <a:endParaRPr lang="en-GB"/>
           </a:p>
@@ -1827,7 +1832,7 @@
           <a:p>
             <a:fld id="{4CC1A8DB-AB3A-4A3D-B199-FBA3EFAF3F32}" type="datetimeFigureOut">
               <a:rPr lang="en-GB" smtClean="0"/>
-              <a:t>17/01/2026</a:t>
+              <a:t>18/01/2026</a:t>
             </a:fld>
             <a:endParaRPr lang="en-GB"/>
           </a:p>
@@ -2104,7 +2109,7 @@
           <a:p>
             <a:fld id="{4CC1A8DB-AB3A-4A3D-B199-FBA3EFAF3F32}" type="datetimeFigureOut">
               <a:rPr lang="en-GB" smtClean="0"/>
-              <a:t>17/01/2026</a:t>
+              <a:t>18/01/2026</a:t>
             </a:fld>
             <a:endParaRPr lang="en-GB"/>
           </a:p>
@@ -2361,7 +2366,7 @@
           <a:p>
             <a:fld id="{4CC1A8DB-AB3A-4A3D-B199-FBA3EFAF3F32}" type="datetimeFigureOut">
               <a:rPr lang="en-GB" smtClean="0"/>
-              <a:t>17/01/2026</a:t>
+              <a:t>18/01/2026</a:t>
             </a:fld>
             <a:endParaRPr lang="en-GB"/>
           </a:p>
@@ -2574,7 +2579,7 @@
           <a:p>
             <a:fld id="{4CC1A8DB-AB3A-4A3D-B199-FBA3EFAF3F32}" type="datetimeFigureOut">
               <a:rPr lang="en-GB" smtClean="0"/>
-              <a:t>17/01/2026</a:t>
+              <a:t>18/01/2026</a:t>
             </a:fld>
             <a:endParaRPr lang="en-GB"/>
           </a:p>
@@ -3025,8 +3030,8 @@
         </p:blipFill>
         <p:spPr>
           <a:xfrm>
-            <a:off x="3643590" y="-289176"/>
-            <a:ext cx="6209359" cy="2192106"/>
+            <a:off x="3133923" y="-275559"/>
+            <a:ext cx="6863953" cy="2423199"/>
           </a:xfrm>
           <a:prstGeom prst="rect">
             <a:avLst/>
@@ -3047,8 +3052,8 @@
         </p:nvSpPr>
         <p:spPr>
           <a:xfrm>
-            <a:off x="1632390" y="3100411"/>
-            <a:ext cx="10547430" cy="1759456"/>
+            <a:off x="489355" y="3044739"/>
+            <a:ext cx="12517820" cy="1193147"/>
           </a:xfrm>
           <a:prstGeom prst="rect">
             <a:avLst/>
@@ -3109,13 +3114,13 @@
           <p:nvPr>
             <p:extLst>
               <p:ext uri="{D42A27DB-BD31-4B8C-83A1-F6EECF244321}">
-                <p14:modId xmlns:p14="http://schemas.microsoft.com/office/powerpoint/2010/main" val="1174667242"/>
+                <p14:modId xmlns:p14="http://schemas.microsoft.com/office/powerpoint/2010/main" val="1536835639"/>
               </p:ext>
             </p:extLst>
           </p:nvPr>
         </p:nvGraphicFramePr>
         <p:xfrm>
-          <a:off x="3062905" y="4923440"/>
+          <a:off x="3062903" y="4620969"/>
           <a:ext cx="7370723" cy="1271016"/>
         </p:xfrm>
         <a:graphic>
@@ -3306,7 +3311,7 @@
         </p:nvSpPr>
         <p:spPr bwMode="auto">
           <a:xfrm>
-            <a:off x="3300631" y="6499670"/>
+            <a:off x="3142790" y="6184359"/>
             <a:ext cx="7210948" cy="400110"/>
           </a:xfrm>
           <a:prstGeom prst="rect">
@@ -3413,8 +3418,8 @@
         </p:nvSpPr>
         <p:spPr>
           <a:xfrm>
-            <a:off x="4918021" y="1827690"/>
-            <a:ext cx="3660493" cy="392993"/>
+            <a:off x="4598490" y="1932786"/>
+            <a:ext cx="4299551" cy="426399"/>
           </a:xfrm>
           <a:prstGeom prst="rect">
             <a:avLst/>
@@ -3440,7 +3445,7 @@
               <a:buNone/>
             </a:pPr>
             <a:r>
-              <a:rPr lang="en-GB" sz="1800" b="1" kern="100" dirty="0">
+              <a:rPr lang="en-GB" sz="2000" b="1" kern="100" dirty="0">
                 <a:solidFill>
                   <a:srgbClr val="000000"/>
                 </a:solidFill>
@@ -3452,7 +3457,7 @@
               <a:t>KIE4033 </a:t>
             </a:r>
             <a:r>
-              <a:rPr lang="en-GB" sz="1800" b="1" kern="100" dirty="0">
+              <a:rPr lang="en-GB" sz="2000" b="1" kern="100" dirty="0">
                 <a:effectLst/>
                 <a:latin typeface="Times New Roman" panose="02020603050405020304" pitchFamily="18" charset="0"/>
                 <a:ea typeface="Aptos" panose="020B0004020202020204" pitchFamily="34" charset="0"/>
@@ -3460,7 +3465,7 @@
               </a:rPr>
               <a:t>Data Analytics 2025/2026</a:t>
             </a:r>
-            <a:endParaRPr lang="en-GB" sz="1400" kern="100" dirty="0">
+            <a:endParaRPr lang="en-GB" sz="1600" kern="100" dirty="0">
               <a:effectLst/>
               <a:latin typeface="Aptos" panose="020B0004020202020204" pitchFamily="34" charset="0"/>
               <a:ea typeface="Aptos" panose="020B0004020202020204" pitchFamily="34" charset="0"/>
@@ -4355,8 +4360,8 @@
         </p:nvSpPr>
         <p:spPr>
           <a:xfrm>
-            <a:off x="2506291" y="4205297"/>
-            <a:ext cx="10493429" cy="3044181"/>
+            <a:off x="2506289" y="4236828"/>
+            <a:ext cx="9924971" cy="2689489"/>
           </a:xfrm>
         </p:spPr>
         <p:txBody>
@@ -4369,7 +4374,7 @@
               <a:buNone/>
             </a:pPr>
             <a:r>
-              <a:rPr lang="en-US" sz="2600" dirty="0"/>
+              <a:rPr lang="en-US" sz="2400" dirty="0"/>
               <a:t>An AI-driven framework that automates detection and clinical stratification using bio-medical feature engineering</a:t>
             </a:r>
           </a:p>
@@ -4377,14 +4382,8 @@
             <a:pPr marL="0" indent="0">
               <a:buNone/>
             </a:pPr>
-            <a:endParaRPr lang="en-US" sz="2600" dirty="0"/>
-          </a:p>
-          <a:p>
-            <a:pPr marL="0" indent="0">
-              <a:buNone/>
-            </a:pPr>
-            <a:r>
-              <a:rPr lang="en-US" sz="2600" dirty="0"/>
+            <a:r>
+              <a:rPr lang="en-US" sz="2400" dirty="0"/>
               <a:t>Results: </a:t>
             </a:r>
           </a:p>
@@ -4393,15 +4392,15 @@
               <a:buAutoNum type="arabicPeriod"/>
             </a:pPr>
             <a:r>
-              <a:rPr lang="en-US" altLang="en-US" sz="2600" dirty="0"/>
+              <a:rPr lang="en-US" altLang="en-US" sz="2400" dirty="0"/>
               <a:t>Optimized Random Forest achieved </a:t>
             </a:r>
             <a:r>
-              <a:rPr lang="en-US" altLang="en-US" sz="2600" b="1" dirty="0"/>
+              <a:rPr lang="en-US" altLang="en-US" sz="2400" b="1" dirty="0"/>
               <a:t>94% accuracy</a:t>
             </a:r>
             <a:r>
-              <a:rPr lang="en-US" altLang="en-US" sz="2600" dirty="0"/>
+              <a:rPr lang="en-US" altLang="en-US" sz="2400" dirty="0"/>
               <a:t> (0.99 AUC)</a:t>
             </a:r>
           </a:p>
@@ -4410,23 +4409,23 @@
               <a:buAutoNum type="arabicPeriod"/>
             </a:pPr>
             <a:r>
-              <a:rPr lang="en-US" altLang="en-US" sz="2600" dirty="0"/>
+              <a:rPr lang="en-US" altLang="en-US" sz="2400" dirty="0"/>
               <a:t>K-Means clustering </a:t>
             </a:r>
             <a:r>
-              <a:rPr lang="en-US" altLang="en-US" sz="2600" b="1" dirty="0"/>
+              <a:rPr lang="en-US" altLang="en-US" sz="2400" b="1" dirty="0"/>
               <a:t>(K=6) </a:t>
             </a:r>
             <a:r>
-              <a:rPr lang="en-US" altLang="en-US" sz="2600" dirty="0"/>
+              <a:rPr lang="en-US" altLang="en-US" sz="2400" dirty="0"/>
               <a:t>programmatically maps wounds to the clinical </a:t>
             </a:r>
             <a:r>
-              <a:rPr lang="en-US" altLang="en-US" sz="2600" b="1" dirty="0"/>
+              <a:rPr lang="en-US" altLang="en-US" sz="2400" b="1" dirty="0"/>
               <a:t>Wagner Classification System</a:t>
             </a:r>
             <a:r>
-              <a:rPr lang="en-US" altLang="en-US" sz="2600" dirty="0"/>
+              <a:rPr lang="en-US" altLang="en-US" sz="2400" dirty="0"/>
               <a:t>.</a:t>
             </a:r>
           </a:p>
@@ -4476,8 +4475,8 @@
         </p:nvSpPr>
         <p:spPr>
           <a:xfrm>
-            <a:off x="2506291" y="1477885"/>
-            <a:ext cx="10416396" cy="887935"/>
+            <a:off x="2506291" y="1510223"/>
+            <a:ext cx="9924969" cy="830997"/>
           </a:xfrm>
           <a:prstGeom prst="rect">
             <a:avLst/>
@@ -4491,7 +4490,7 @@
           <a:lstStyle/>
           <a:p>
             <a:r>
-              <a:rPr lang="en-US" sz="2600" dirty="0"/>
+              <a:rPr lang="en-US" sz="2400" dirty="0"/>
               <a:t>Diabetic foot ulcers (DFUs) require precise monitoring to prevent life-threatening amputations.</a:t>
             </a:r>
           </a:p>
@@ -4541,8 +4540,8 @@
         </p:nvSpPr>
         <p:spPr>
           <a:xfrm>
-            <a:off x="2506291" y="3038224"/>
-            <a:ext cx="10625509" cy="887935"/>
+            <a:off x="2440250" y="2976575"/>
+            <a:ext cx="9991010" cy="830997"/>
           </a:xfrm>
           <a:prstGeom prst="rect">
             <a:avLst/>
@@ -4556,7 +4555,7 @@
           <a:lstStyle/>
           <a:p>
             <a:r>
-              <a:rPr lang="en-US" sz="2600" dirty="0"/>
+              <a:rPr lang="en-US" sz="2400" dirty="0"/>
               <a:t>Previous RM-2 monitoring device relied on geometric data (area, perimeter), failing to capture biological states like infection or necrosis.</a:t>
             </a:r>
           </a:p>
@@ -4694,7 +4693,7 @@
         </p:nvSpPr>
         <p:spPr>
           <a:xfrm>
-            <a:off x="5804589" y="2815094"/>
+            <a:off x="5804589" y="3141776"/>
             <a:ext cx="7084060" cy="2497269"/>
           </a:xfrm>
         </p:spPr>
@@ -4708,7 +4707,7 @@
               <a:buNone/>
             </a:pPr>
             <a:r>
-              <a:rPr lang="en-US" altLang="en-US" sz="2600" dirty="0"/>
+              <a:rPr lang="en-US" altLang="en-US" sz="2400" dirty="0"/>
               <a:t>Uses CIE LAB colour space to assess Erythema (inflammation) and Necrosis (tissue death) independently of lighting conditions.</a:t>
             </a:r>
           </a:p>
@@ -4717,7 +4716,7 @@
               <a:buNone/>
             </a:pPr>
             <a:r>
-              <a:rPr lang="en-US" altLang="en-US" sz="2600" dirty="0"/>
+              <a:rPr lang="en-US" altLang="en-US" sz="2400" dirty="0"/>
               <a:t>Enable remote specialist triage by distinguishing healthy skin from ulcers and defining six stages of clinical severity.</a:t>
             </a:r>
           </a:p>
@@ -4738,7 +4737,7 @@
         <p:spPr>
           <a:xfrm>
             <a:off x="355545" y="3381768"/>
-            <a:ext cx="4526280" cy="1683538"/>
+            <a:ext cx="4526280" cy="1569660"/>
           </a:xfrm>
           <a:prstGeom prst="rect">
             <a:avLst/>
@@ -4753,7 +4752,7 @@
           <a:p>
             <a:pPr algn="just"/>
             <a:r>
-              <a:rPr lang="en-US" sz="2600" dirty="0"/>
+              <a:rPr lang="en-US" sz="2400" dirty="0"/>
               <a:t>Patients in rural areas (e.g., Sabah) often delay treatment due to travel distances and financial costs.</a:t>
             </a:r>
           </a:p>
@@ -4774,7 +4773,7 @@
         <p:spPr>
           <a:xfrm>
             <a:off x="4259547" y="6118862"/>
-            <a:ext cx="7845869" cy="892552"/>
+            <a:ext cx="7845869" cy="830997"/>
           </a:xfrm>
           <a:prstGeom prst="rect">
             <a:avLst/>
@@ -4789,7 +4788,7 @@
           <a:p>
             <a:pPr algn="just"/>
             <a:r>
-              <a:rPr lang="en-US" sz="2600" dirty="0"/>
+              <a:rPr lang="en-US" sz="2400" dirty="0"/>
               <a:t>Transitions the RM-2 tool from a "reactive wound tracker" to a proactive medical companion.</a:t>
             </a:r>
           </a:p>
@@ -4879,7 +4878,7 @@
         </p:blipFill>
         <p:spPr>
           <a:xfrm>
-            <a:off x="9795739" y="220643"/>
+            <a:off x="9795739" y="563247"/>
             <a:ext cx="2309677" cy="2441316"/>
           </a:xfrm>
           <a:prstGeom prst="rect">
@@ -4909,7 +4908,7 @@
         </p:blipFill>
         <p:spPr>
           <a:xfrm>
-            <a:off x="6565900" y="1033551"/>
+            <a:off x="6565900" y="1356959"/>
             <a:ext cx="2933700" cy="1704975"/>
           </a:xfrm>
           <a:prstGeom prst="rect">
@@ -5593,7 +5592,7 @@
         <p:spPr>
           <a:xfrm>
             <a:off x="989094" y="1104818"/>
-            <a:ext cx="5958244" cy="2031325"/>
+            <a:ext cx="5233030" cy="2031325"/>
           </a:xfrm>
           <a:prstGeom prst="rect">
             <a:avLst/>
@@ -5786,14 +5785,14 @@
           <p:nvPr>
             <p:extLst>
               <p:ext uri="{D42A27DB-BD31-4B8C-83A1-F6EECF244321}">
-                <p14:modId xmlns:p14="http://schemas.microsoft.com/office/powerpoint/2010/main" val="246173976"/>
+                <p14:modId xmlns:p14="http://schemas.microsoft.com/office/powerpoint/2010/main" val="757644089"/>
               </p:ext>
             </p:extLst>
           </p:nvPr>
         </p:nvGraphicFramePr>
         <p:xfrm>
           <a:off x="6652183" y="1039055"/>
-          <a:ext cx="6207760" cy="2152650"/>
+          <a:ext cx="6412176" cy="2238248"/>
         </p:xfrm>
         <a:graphic>
           <a:graphicData uri="http://schemas.openxmlformats.org/drawingml/2006/table">
@@ -5809,14 +5808,14 @@
                     </a:ext>
                   </a:extLst>
                 </a:gridCol>
-                <a:gridCol w="2580731">
+                <a:gridCol w="2369750">
                   <a:extLst>
                     <a:ext uri="{9D8B030D-6E8A-4147-A177-3AD203B41FA5}">
                       <a16:colId xmlns:a16="http://schemas.microsoft.com/office/drawing/2014/main" val="1822914976"/>
                     </a:ext>
                   </a:extLst>
                 </a:gridCol>
-                <a:gridCol w="2538010">
+                <a:gridCol w="2953407">
                   <a:extLst>
                     <a:ext uri="{9D8B030D-6E8A-4147-A177-3AD203B41FA5}">
                       <a16:colId xmlns:a16="http://schemas.microsoft.com/office/drawing/2014/main" val="4044515395"/>
@@ -5870,12 +5869,12 @@
                         <a:buNone/>
                       </a:pPr>
                       <a:r>
-                        <a:rPr lang="en-MY" sz="1200" kern="100">
+                        <a:rPr lang="en-MY" sz="1200" kern="100" dirty="0">
                           <a:effectLst/>
                         </a:rPr>
-                        <a:t>Features</a:t>
+                        <a:t>Features Data</a:t>
                       </a:r>
-                      <a:endParaRPr lang="en-GB" sz="1200" kern="100">
+                      <a:endParaRPr lang="en-GB" sz="1200" kern="100" dirty="0">
                         <a:effectLst/>
                         <a:latin typeface="Aptos" panose="020B0004020202020204" pitchFamily="34" charset="0"/>
                         <a:ea typeface="Aptos" panose="020B0004020202020204" pitchFamily="34" charset="0"/>
@@ -5900,12 +5899,12 @@
                         <a:buNone/>
                       </a:pPr>
                       <a:r>
-                        <a:rPr lang="en-MY" sz="1200" kern="100">
+                        <a:rPr lang="en-MY" sz="1200" kern="100" dirty="0">
                           <a:effectLst/>
                         </a:rPr>
                         <a:t>Purpose</a:t>
                       </a:r>
-                      <a:endParaRPr lang="en-GB" sz="1200" kern="100">
+                      <a:endParaRPr lang="en-GB" sz="1200" kern="100" dirty="0">
                         <a:effectLst/>
                         <a:latin typeface="Aptos" panose="020B0004020202020204" pitchFamily="34" charset="0"/>
                         <a:ea typeface="Aptos" panose="020B0004020202020204" pitchFamily="34" charset="0"/>
@@ -5959,20 +5958,71 @@
                     <a:p>
                       <a:pPr algn="just">
                         <a:lnSpc>
-                          <a:spcPct val="115000"/>
+                          <a:spcPct val="100000"/>
                         </a:lnSpc>
                         <a:spcAft>
-                          <a:spcPts val="800"/>
+                          <a:spcPts val="200"/>
                         </a:spcAft>
                         <a:buNone/>
                       </a:pPr>
                       <a:r>
-                        <a:rPr lang="en-MY" sz="1200" kern="100">
+                        <a:rPr lang="en-MY" sz="1200" kern="100" dirty="0">
                           <a:effectLst/>
                         </a:rPr>
-                        <a:t>Area, Perimeter, Solidity &amp; Eccentricity</a:t>
+                        <a:t>Area </a:t>
                       </a:r>
-                      <a:endParaRPr lang="en-GB" sz="1200" kern="100">
+                    </a:p>
+                    <a:p>
+                      <a:pPr algn="just">
+                        <a:lnSpc>
+                          <a:spcPct val="100000"/>
+                        </a:lnSpc>
+                        <a:spcAft>
+                          <a:spcPts val="200"/>
+                        </a:spcAft>
+                        <a:buNone/>
+                      </a:pPr>
+                      <a:r>
+                        <a:rPr lang="en-MY" sz="1200" kern="100" dirty="0">
+                          <a:effectLst/>
+                        </a:rPr>
+                        <a:t>Perimeter</a:t>
+                      </a:r>
+                    </a:p>
+                    <a:p>
+                      <a:pPr algn="just">
+                        <a:lnSpc>
+                          <a:spcPct val="100000"/>
+                        </a:lnSpc>
+                        <a:spcAft>
+                          <a:spcPts val="200"/>
+                        </a:spcAft>
+                        <a:buNone/>
+                      </a:pPr>
+                      <a:r>
+                        <a:rPr lang="en-MY" sz="1200" kern="100" dirty="0">
+                          <a:effectLst/>
+                        </a:rPr>
+                        <a:t>Solidity </a:t>
+                      </a:r>
+                    </a:p>
+                    <a:p>
+                      <a:pPr algn="just">
+                        <a:lnSpc>
+                          <a:spcPct val="100000"/>
+                        </a:lnSpc>
+                        <a:spcAft>
+                          <a:spcPts val="200"/>
+                        </a:spcAft>
+                        <a:buNone/>
+                      </a:pPr>
+                      <a:r>
+                        <a:rPr lang="en-MY" sz="1200" kern="100" dirty="0">
+                          <a:effectLst/>
+                        </a:rPr>
+                        <a:t>Eccentricity</a:t>
+                      </a:r>
+                      <a:endParaRPr lang="en-GB" sz="1200" kern="100" dirty="0">
                         <a:effectLst/>
                         <a:latin typeface="Aptos" panose="020B0004020202020204" pitchFamily="34" charset="0"/>
                         <a:ea typeface="Aptos" panose="020B0004020202020204" pitchFamily="34" charset="0"/>
@@ -6056,40 +6106,40 @@
                     <a:p>
                       <a:pPr algn="just">
                         <a:lnSpc>
-                          <a:spcPct val="115000"/>
+                          <a:spcPct val="100000"/>
                         </a:lnSpc>
                         <a:spcAft>
-                          <a:spcPts val="800"/>
+                          <a:spcPts val="200"/>
                         </a:spcAft>
                         <a:buNone/>
                       </a:pPr>
                       <a:r>
-                        <a:rPr lang="en-MY" sz="1200" kern="100">
+                        <a:rPr lang="en-MY" sz="1200" kern="100" dirty="0">
                           <a:effectLst/>
                         </a:rPr>
                         <a:t>Erythema Index (mean A-channel) </a:t>
                       </a:r>
-                      <a:endParaRPr lang="en-GB" sz="1200" kern="100">
+                      <a:endParaRPr lang="en-GB" sz="1200" kern="100" dirty="0">
                         <a:effectLst/>
                       </a:endParaRPr>
                     </a:p>
                     <a:p>
                       <a:pPr algn="just">
                         <a:lnSpc>
-                          <a:spcPct val="115000"/>
+                          <a:spcPct val="100000"/>
                         </a:lnSpc>
                         <a:spcAft>
-                          <a:spcPts val="800"/>
+                          <a:spcPts val="200"/>
                         </a:spcAft>
                         <a:buNone/>
                       </a:pPr>
                       <a:r>
-                        <a:rPr lang="en-MY" sz="1200" kern="100">
+                        <a:rPr lang="en-MY" sz="1200" kern="100" dirty="0">
                           <a:effectLst/>
                         </a:rPr>
                         <a:t>Necrosis Index (mean L-channel)</a:t>
                       </a:r>
-                      <a:endParaRPr lang="en-GB" sz="1200" kern="100">
+                      <a:endParaRPr lang="en-GB" sz="1200" kern="100" dirty="0">
                         <a:effectLst/>
                         <a:latin typeface="Aptos" panose="020B0004020202020204" pitchFamily="34" charset="0"/>
                         <a:ea typeface="Aptos" panose="020B0004020202020204" pitchFamily="34" charset="0"/>
@@ -6114,12 +6164,12 @@
                         <a:buNone/>
                       </a:pPr>
                       <a:r>
-                        <a:rPr lang="en-MY" sz="1200" kern="100">
+                        <a:rPr lang="en-MY" sz="1200" kern="100" dirty="0">
                           <a:effectLst/>
                         </a:rPr>
                         <a:t>Calculated to provide the biological context</a:t>
                       </a:r>
-                      <a:endParaRPr lang="en-GB" sz="1200" kern="100">
+                      <a:endParaRPr lang="en-GB" sz="1200" kern="100" dirty="0">
                         <a:effectLst/>
                         <a:latin typeface="Aptos" panose="020B0004020202020204" pitchFamily="34" charset="0"/>
                         <a:ea typeface="Aptos" panose="020B0004020202020204" pitchFamily="34" charset="0"/>
@@ -6181,12 +6231,12 @@
                         <a:buNone/>
                       </a:pPr>
                       <a:r>
-                        <a:rPr lang="en-MY" sz="1200" kern="100">
+                        <a:rPr lang="en-MY" sz="1200" kern="100" dirty="0">
                           <a:effectLst/>
                         </a:rPr>
                         <a:t>Colour Variance (standard deviation of the image)</a:t>
                       </a:r>
-                      <a:endParaRPr lang="en-GB" sz="1200" kern="100">
+                      <a:endParaRPr lang="en-GB" sz="1200" kern="100" dirty="0">
                         <a:effectLst/>
                         <a:latin typeface="Aptos" panose="020B0004020202020204" pitchFamily="34" charset="0"/>
                         <a:ea typeface="Aptos" panose="020B0004020202020204" pitchFamily="34" charset="0"/>
@@ -6871,7 +6921,7 @@
         <p:spPr>
           <a:xfrm>
             <a:off x="710919" y="2980403"/>
-            <a:ext cx="3102891" cy="916683"/>
+            <a:ext cx="3102891" cy="2474466"/>
           </a:xfrm>
         </p:spPr>
         <p:txBody>
@@ -6892,6 +6942,29 @@
               </a:rPr>
               <a:t>EDA</a:t>
             </a:r>
+            <a:br>
+              <a:rPr lang="en-US" sz="4300" b="1" dirty="0">
+                <a:solidFill>
+                  <a:srgbClr val="FFFFFF"/>
+                </a:solidFill>
+              </a:rPr>
+            </a:br>
+            <a:r>
+              <a:rPr lang="en-US" sz="3900" b="1" dirty="0">
+                <a:solidFill>
+                  <a:srgbClr val="FFFFFF"/>
+                </a:solidFill>
+              </a:rPr>
+              <a:t>Univariate Feature Distributions</a:t>
+            </a:r>
+            <a:endParaRPr lang="en-US" sz="3900" b="1" kern="1200" dirty="0">
+              <a:solidFill>
+                <a:srgbClr val="FFFFFF"/>
+              </a:solidFill>
+              <a:latin typeface="+mj-lt"/>
+              <a:ea typeface="+mj-ea"/>
+              <a:cs typeface="+mj-cs"/>
+            </a:endParaRPr>
           </a:p>
         </p:txBody>
       </p:sp>
@@ -7484,6 +7557,29 @@
               </a:rPr>
               <a:t>EDA</a:t>
             </a:r>
+            <a:br>
+              <a:rPr lang="en-US" sz="4300" b="1" dirty="0">
+                <a:solidFill>
+                  <a:srgbClr val="FFFFFF"/>
+                </a:solidFill>
+              </a:rPr>
+            </a:br>
+            <a:r>
+              <a:rPr lang="en-US" sz="3900" b="1" dirty="0">
+                <a:solidFill>
+                  <a:srgbClr val="FFFFFF"/>
+                </a:solidFill>
+              </a:rPr>
+              <a:t>Comparative Boxplot Analysis</a:t>
+            </a:r>
+            <a:endParaRPr lang="en-US" sz="3900" b="1" kern="1200" dirty="0">
+              <a:solidFill>
+                <a:srgbClr val="FFFFFF"/>
+              </a:solidFill>
+              <a:latin typeface="+mj-lt"/>
+              <a:ea typeface="+mj-ea"/>
+              <a:cs typeface="+mj-cs"/>
+            </a:endParaRPr>
           </a:p>
         </p:txBody>
       </p:sp>
@@ -8076,6 +8172,29 @@
               </a:rPr>
               <a:t>EDA</a:t>
             </a:r>
+            <a:br>
+              <a:rPr lang="en-US" sz="4300" b="1" dirty="0">
+                <a:solidFill>
+                  <a:srgbClr val="FFFFFF"/>
+                </a:solidFill>
+              </a:rPr>
+            </a:br>
+            <a:r>
+              <a:rPr lang="en-US" sz="3900" b="1" dirty="0">
+                <a:solidFill>
+                  <a:srgbClr val="FFFFFF"/>
+                </a:solidFill>
+              </a:rPr>
+              <a:t>Feature Correlation Matrix</a:t>
+            </a:r>
+            <a:endParaRPr lang="en-US" sz="3900" b="1" kern="1200" dirty="0">
+              <a:solidFill>
+                <a:srgbClr val="FFFFFF"/>
+              </a:solidFill>
+              <a:latin typeface="+mj-lt"/>
+              <a:ea typeface="+mj-ea"/>
+              <a:cs typeface="+mj-cs"/>
+            </a:endParaRPr>
           </a:p>
         </p:txBody>
       </p:sp>

</xml_diff>